<commit_message>
908311-Resolved Layout slide and Section samples
</commit_message>
<xml_diff>
--- a/Slides/Add-slide-with-existing-slide-layout/.NET/Add-slide-with-existing-slide-layout/Data/Template.pptx
+++ b/Slides/Add-slide-with-existing-slide-layout/.NET/Add-slide-with-existing-slide-layout/Data/Template.pptx
@@ -285,7 +285,7 @@
           <a:p>
             <a:fld id="{8669AFDC-7658-4951-B0FF-52DFF2A93C0A}" type="datetimeFigureOut">
               <a:rPr lang="en-US" dirty="0"/>
-              <a:t>12/29/2022</a:t>
+              <a:t>9/17/2024</a:t>
             </a:fld>
             <a:endParaRPr lang="en-US" dirty="0"/>
           </a:p>
@@ -469,7 +469,7 @@
           <a:p>
             <a:fld id="{3ABD2D7A-D230-4F91-BD59-0A39C2703BA8}" type="datetimeFigureOut">
               <a:rPr lang="en-US" dirty="0"/>
-              <a:t>12/29/2022</a:t>
+              <a:t>9/17/2024</a:t>
             </a:fld>
             <a:endParaRPr lang="en-US" dirty="0"/>
           </a:p>
@@ -886,7 +886,7 @@
           <a:p>
             <a:fld id="{B61BEF0D-F0BB-DE4B-95CE-6DB70DBA9567}" type="datetimeFigureOut">
               <a:rPr lang="en-US" dirty="0"/>
-              <a:t>12/29/2022</a:t>
+              <a:t>9/17/2024</a:t>
             </a:fld>
             <a:endParaRPr lang="en-US" dirty="0"/>
           </a:p>
@@ -953,6 +953,279 @@
 </file>
 
 <file path=ppt/slideLayouts/slideLayout10.xml><?xml version="1.0" encoding="utf-8"?>
+<p:sldLayout xmlns:a="http://schemas.openxmlformats.org/drawingml/2006/main" xmlns:r="http://schemas.openxmlformats.org/officeDocument/2006/relationships" xmlns:p="http://schemas.openxmlformats.org/presentationml/2006/main">
+  <p:cSld name="Picture with Caption">
+    <p:spTree>
+      <p:nvGrpSpPr>
+        <p:cNvPr id="1" name=""/>
+        <p:cNvGrpSpPr/>
+        <p:nvPr/>
+      </p:nvGrpSpPr>
+      <p:grpSpPr>
+        <a:xfrm>
+          <a:off x="0" y="0"/>
+          <a:ext cx="0" cy="0"/>
+          <a:chOff x="0" y="0"/>
+          <a:chExt cx="0" cy="0"/>
+        </a:xfrm>
+      </p:grpSpPr>
+      <p:sp>
+        <p:nvSpPr>
+          <p:cNvPr id="2" name="Title 1"/>
+          <p:cNvSpPr>
+            <a:spLocks noGrp="1"/>
+          </p:cNvSpPr>
+          <p:nvPr>
+            <p:ph type="title"/>
+          </p:nvPr>
+        </p:nvSpPr>
+        <p:spPr bwMode="white">
+          <a:xfrm>
+            <a:off x="839570" y="457200"/>
+            <a:ext cx="3931213" cy="1600200"/>
+          </a:xfrm>
+          <a:ln>
+            <a:headEnd type="none"/>
+            <a:tailEnd type="none"/>
+          </a:ln>
+        </p:spPr>
+        <p:txBody>
+          <a:bodyPr wrap="square" anchor="b"/>
+          <a:lstStyle>
+            <a:lvl1pPr>
+              <a:defRPr sz="3199" dirty="0"/>
+            </a:lvl1pPr>
+          </a:lstStyle>
+          <a:p>
+            <a:r>
+              <a:rPr lang="en-US" dirty="0"/>
+              <a:t>Click to edit Master title style</a:t>
+            </a:r>
+          </a:p>
+        </p:txBody>
+      </p:sp>
+      <p:sp>
+        <p:nvSpPr>
+          <p:cNvPr id="3" name="Picture Placeholder 2"/>
+          <p:cNvSpPr>
+            <a:spLocks noGrp="1"/>
+          </p:cNvSpPr>
+          <p:nvPr>
+            <p:ph type="pic" idx="1"/>
+          </p:nvPr>
+        </p:nvSpPr>
+        <p:spPr bwMode="white">
+          <a:xfrm>
+            <a:off x="5181838" y="987426"/>
+            <a:ext cx="6170593" cy="4873625"/>
+          </a:xfrm>
+          <a:ln>
+            <a:headEnd type="none"/>
+            <a:tailEnd type="none"/>
+          </a:ln>
+        </p:spPr>
+        <p:txBody>
+          <a:bodyPr wrap="square"/>
+          <a:lstStyle>
+            <a:lvl1pPr marL="0" indent="0">
+              <a:buNone/>
+              <a:defRPr sz="3199" dirty="0"/>
+            </a:lvl1pPr>
+            <a:lvl2pPr marL="457063" indent="0">
+              <a:buNone/>
+              <a:defRPr sz="2799" dirty="0"/>
+            </a:lvl2pPr>
+            <a:lvl3pPr marL="914126" indent="0">
+              <a:buNone/>
+              <a:defRPr sz="2399" dirty="0"/>
+            </a:lvl3pPr>
+            <a:lvl4pPr marL="1371189" indent="0">
+              <a:buNone/>
+              <a:defRPr sz="1999" dirty="0"/>
+            </a:lvl4pPr>
+            <a:lvl5pPr marL="1828251" indent="0">
+              <a:buNone/>
+              <a:defRPr sz="1999" dirty="0"/>
+            </a:lvl5pPr>
+            <a:lvl6pPr marL="2285314" indent="0">
+              <a:buNone/>
+              <a:defRPr sz="1999" dirty="0"/>
+            </a:lvl6pPr>
+            <a:lvl7pPr marL="2742377" indent="0">
+              <a:buNone/>
+              <a:defRPr sz="1999" dirty="0"/>
+            </a:lvl7pPr>
+            <a:lvl8pPr marL="3199440" indent="0">
+              <a:buNone/>
+              <a:defRPr sz="1999" dirty="0"/>
+            </a:lvl8pPr>
+            <a:lvl9pPr marL="3656503" indent="0">
+              <a:buNone/>
+              <a:defRPr sz="1999" dirty="0"/>
+            </a:lvl9pPr>
+          </a:lstStyle>
+          <a:p>
+            <a:endParaRPr lang="en-US" dirty="0"/>
+          </a:p>
+        </p:txBody>
+      </p:sp>
+      <p:sp>
+        <p:nvSpPr>
+          <p:cNvPr id="4" name="Text Placeholder 3"/>
+          <p:cNvSpPr>
+            <a:spLocks noGrp="1"/>
+          </p:cNvSpPr>
+          <p:nvPr>
+            <p:ph type="body" sz="half" idx="2"/>
+          </p:nvPr>
+        </p:nvSpPr>
+        <p:spPr bwMode="white">
+          <a:xfrm>
+            <a:off x="839570" y="2057400"/>
+            <a:ext cx="3931213" cy="3811588"/>
+          </a:xfrm>
+          <a:ln>
+            <a:headEnd type="none"/>
+            <a:tailEnd type="none"/>
+          </a:ln>
+        </p:spPr>
+        <p:txBody>
+          <a:bodyPr wrap="square"/>
+          <a:lstStyle>
+            <a:lvl1pPr marL="0" indent="0">
+              <a:buNone/>
+              <a:defRPr sz="1600" dirty="0"/>
+            </a:lvl1pPr>
+            <a:lvl2pPr marL="457063" indent="0">
+              <a:buNone/>
+              <a:defRPr sz="1400" dirty="0"/>
+            </a:lvl2pPr>
+            <a:lvl3pPr marL="914126" indent="0">
+              <a:buNone/>
+              <a:defRPr sz="1200" dirty="0"/>
+            </a:lvl3pPr>
+            <a:lvl4pPr marL="1371189" indent="0">
+              <a:buNone/>
+              <a:defRPr sz="1000" dirty="0"/>
+            </a:lvl4pPr>
+            <a:lvl5pPr marL="1828251" indent="0">
+              <a:buNone/>
+              <a:defRPr sz="1000" dirty="0"/>
+            </a:lvl5pPr>
+            <a:lvl6pPr marL="2285314" indent="0">
+              <a:buNone/>
+              <a:defRPr sz="1000" dirty="0"/>
+            </a:lvl6pPr>
+            <a:lvl7pPr marL="2742377" indent="0">
+              <a:buNone/>
+              <a:defRPr sz="1000" dirty="0"/>
+            </a:lvl7pPr>
+            <a:lvl8pPr marL="3199440" indent="0">
+              <a:buNone/>
+              <a:defRPr sz="1000" dirty="0"/>
+            </a:lvl8pPr>
+            <a:lvl9pPr marL="3656503" indent="0">
+              <a:buNone/>
+              <a:defRPr sz="1000" dirty="0"/>
+            </a:lvl9pPr>
+          </a:lstStyle>
+          <a:p>
+            <a:r>
+              <a:rPr lang="en-US" dirty="0"/>
+              <a:t>Click to edit Master text styles</a:t>
+            </a:r>
+          </a:p>
+        </p:txBody>
+      </p:sp>
+      <p:sp>
+        <p:nvSpPr>
+          <p:cNvPr id="5" name="Date Placeholder 4"/>
+          <p:cNvSpPr>
+            <a:spLocks noGrp="1"/>
+          </p:cNvSpPr>
+          <p:nvPr>
+            <p:ph type="dt" sz="half" idx="10"/>
+          </p:nvPr>
+        </p:nvSpPr>
+        <p:spPr bwMode="white">
+          <a:ln>
+            <a:headEnd type="none"/>
+            <a:tailEnd type="none"/>
+          </a:ln>
+        </p:spPr>
+        <p:txBody>
+          <a:bodyPr wrap="square"/>
+          <a:lstStyle/>
+          <a:p>
+            <a:fld id="{B61BEF0D-F0BB-DE4B-95CE-6DB70DBA9567}" type="datetimeFigureOut">
+              <a:rPr lang="en-US" dirty="0"/>
+              <a:t>9/17/2024</a:t>
+            </a:fld>
+            <a:endParaRPr lang="en-US" dirty="0"/>
+          </a:p>
+        </p:txBody>
+      </p:sp>
+      <p:sp>
+        <p:nvSpPr>
+          <p:cNvPr id="6" name="Footer Placeholder 5"/>
+          <p:cNvSpPr>
+            <a:spLocks noGrp="1"/>
+          </p:cNvSpPr>
+          <p:nvPr>
+            <p:ph type="ftr" sz="quarter" idx="11"/>
+          </p:nvPr>
+        </p:nvSpPr>
+        <p:spPr bwMode="white">
+          <a:ln>
+            <a:headEnd type="none"/>
+            <a:tailEnd type="none"/>
+          </a:ln>
+        </p:spPr>
+        <p:txBody>
+          <a:bodyPr wrap="square"/>
+          <a:lstStyle/>
+          <a:p>
+            <a:endParaRPr lang="en-US" dirty="0"/>
+          </a:p>
+        </p:txBody>
+      </p:sp>
+      <p:sp>
+        <p:nvSpPr>
+          <p:cNvPr id="7" name="Slide Number Placeholder 6"/>
+          <p:cNvSpPr>
+            <a:spLocks noGrp="1"/>
+          </p:cNvSpPr>
+          <p:nvPr>
+            <p:ph type="sldNum" sz="quarter" idx="12"/>
+          </p:nvPr>
+        </p:nvSpPr>
+        <p:spPr bwMode="white">
+          <a:ln>
+            <a:headEnd type="none"/>
+            <a:tailEnd type="none"/>
+          </a:ln>
+        </p:spPr>
+        <p:txBody>
+          <a:bodyPr wrap="square"/>
+          <a:lstStyle/>
+          <a:p>
+            <a:fld id="{D57F1E4F-1CFF-5643-939E-217C01CDF565}" type="slidenum">
+              <a:rPr lang="en-US" dirty="0"/>
+              <a:t>‹#›</a:t>
+            </a:fld>
+            <a:endParaRPr lang="en-US" dirty="0"/>
+          </a:p>
+        </p:txBody>
+      </p:sp>
+    </p:spTree>
+  </p:cSld>
+  <p:clrMapOvr>
+    <a:masterClrMapping/>
+  </p:clrMapOvr>
+</p:sldLayout>
+</file>
+
+<file path=ppt/slideLayouts/slideLayout11.xml><?xml version="1.0" encoding="utf-8"?>
 <p:sldLayout xmlns:a="http://schemas.openxmlformats.org/drawingml/2006/main" xmlns:r="http://schemas.openxmlformats.org/officeDocument/2006/relationships" xmlns:p="http://schemas.openxmlformats.org/presentationml/2006/main">
   <p:cSld name="Title and Vertical Text">
     <p:spTree>
@@ -1073,7 +1346,7 @@
           <a:p>
             <a:fld id="{03F41C87-7AD9-4845-A077-840E4A0F3F06}" type="datetimeFigureOut">
               <a:rPr lang="en-US" dirty="0"/>
-              <a:t>12/29/2022</a:t>
+              <a:t>9/17/2024</a:t>
             </a:fld>
             <a:endParaRPr lang="en-US" dirty="0"/>
           </a:p>
@@ -1139,7 +1412,7 @@
 </p:sldLayout>
 </file>
 
-<file path=ppt/slideLayouts/slideLayout11.xml><?xml version="1.0" encoding="utf-8"?>
+<file path=ppt/slideLayouts/slideLayout12.xml><?xml version="1.0" encoding="utf-8"?>
 <p:sldLayout xmlns:a="http://schemas.openxmlformats.org/drawingml/2006/main" xmlns:r="http://schemas.openxmlformats.org/officeDocument/2006/relationships" xmlns:p="http://schemas.openxmlformats.org/presentationml/2006/main">
   <p:cSld name="Vertical Title and Text">
     <p:spTree>
@@ -1268,7 +1541,7 @@
           <a:p>
             <a:fld id="{03F41C87-7AD9-4845-A077-840E4A0F3F06}" type="datetimeFigureOut">
               <a:rPr lang="en-US" dirty="0"/>
-              <a:t>12/29/2022</a:t>
+              <a:t>9/17/2024</a:t>
             </a:fld>
             <a:endParaRPr lang="en-US" dirty="0"/>
           </a:p>
@@ -1335,6 +1608,147 @@
 </file>
 
 <file path=ppt/slideLayouts/slideLayout2.xml><?xml version="1.0" encoding="utf-8"?>
+<p:sldLayout xmlns:a="http://schemas.openxmlformats.org/drawingml/2006/main" xmlns:r="http://schemas.openxmlformats.org/officeDocument/2006/relationships" xmlns:p="http://schemas.openxmlformats.org/presentationml/2006/main" preserve="1" userDrawn="1">
+  <p:cSld name="CustomSlideLayout">
+    <p:spTree>
+      <p:nvGrpSpPr>
+        <p:cNvPr id="1" name=""/>
+        <p:cNvGrpSpPr/>
+        <p:nvPr/>
+      </p:nvGrpSpPr>
+      <p:grpSpPr>
+        <a:xfrm>
+          <a:off x="0" y="0"/>
+          <a:ext cx="0" cy="0"/>
+          <a:chOff x="0" y="0"/>
+          <a:chExt cx="0" cy="0"/>
+        </a:xfrm>
+      </p:grpSpPr>
+      <p:sp>
+        <p:nvSpPr>
+          <p:cNvPr id="2" name="Title 1">
+            <a:extLst>
+              <a:ext uri="{FF2B5EF4-FFF2-40B4-BE49-F238E27FC236}">
+                <a16:creationId xmlns:a16="http://schemas.microsoft.com/office/drawing/2014/main" id="{BDF8810C-5FE7-0C37-B6A0-BB047E2059F8}"/>
+              </a:ext>
+            </a:extLst>
+          </p:cNvPr>
+          <p:cNvSpPr>
+            <a:spLocks noGrp="1"/>
+          </p:cNvSpPr>
+          <p:nvPr>
+            <p:ph type="title"/>
+          </p:nvPr>
+        </p:nvSpPr>
+        <p:spPr/>
+        <p:txBody>
+          <a:bodyPr/>
+          <a:lstStyle/>
+          <a:p>
+            <a:r>
+              <a:rPr lang="en-US"/>
+              <a:t>Click to edit Master title style</a:t>
+            </a:r>
+          </a:p>
+        </p:txBody>
+      </p:sp>
+      <p:sp>
+        <p:nvSpPr>
+          <p:cNvPr id="3" name="Date Placeholder 2">
+            <a:extLst>
+              <a:ext uri="{FF2B5EF4-FFF2-40B4-BE49-F238E27FC236}">
+                <a16:creationId xmlns:a16="http://schemas.microsoft.com/office/drawing/2014/main" id="{8778D68E-D844-F78B-A40E-C2D300831766}"/>
+              </a:ext>
+            </a:extLst>
+          </p:cNvPr>
+          <p:cNvSpPr>
+            <a:spLocks noGrp="1"/>
+          </p:cNvSpPr>
+          <p:nvPr>
+            <p:ph type="dt" sz="half" idx="10"/>
+          </p:nvPr>
+        </p:nvSpPr>
+        <p:spPr/>
+        <p:txBody>
+          <a:bodyPr/>
+          <a:lstStyle/>
+          <a:p>
+            <a:fld id="{03F41C87-7AD9-4845-A077-840E4A0F3F06}" type="datetimeFigureOut">
+              <a:rPr lang="en-US" smtClean="0"/>
+              <a:t>9/17/2024</a:t>
+            </a:fld>
+            <a:endParaRPr lang="en-US" dirty="0"/>
+          </a:p>
+        </p:txBody>
+      </p:sp>
+      <p:sp>
+        <p:nvSpPr>
+          <p:cNvPr id="4" name="Footer Placeholder 3">
+            <a:extLst>
+              <a:ext uri="{FF2B5EF4-FFF2-40B4-BE49-F238E27FC236}">
+                <a16:creationId xmlns:a16="http://schemas.microsoft.com/office/drawing/2014/main" id="{32C648FD-FCA8-4EBD-47D9-F54E578AFB33}"/>
+              </a:ext>
+            </a:extLst>
+          </p:cNvPr>
+          <p:cNvSpPr>
+            <a:spLocks noGrp="1"/>
+          </p:cNvSpPr>
+          <p:nvPr>
+            <p:ph type="ftr" sz="quarter" idx="11"/>
+          </p:nvPr>
+        </p:nvSpPr>
+        <p:spPr/>
+        <p:txBody>
+          <a:bodyPr/>
+          <a:lstStyle/>
+          <a:p>
+            <a:endParaRPr lang="en-US" dirty="0"/>
+          </a:p>
+        </p:txBody>
+      </p:sp>
+      <p:sp>
+        <p:nvSpPr>
+          <p:cNvPr id="5" name="Slide Number Placeholder 4">
+            <a:extLst>
+              <a:ext uri="{FF2B5EF4-FFF2-40B4-BE49-F238E27FC236}">
+                <a16:creationId xmlns:a16="http://schemas.microsoft.com/office/drawing/2014/main" id="{312A5594-EC05-F7EC-D1CD-396A5BA3A2CC}"/>
+              </a:ext>
+            </a:extLst>
+          </p:cNvPr>
+          <p:cNvSpPr>
+            <a:spLocks noGrp="1"/>
+          </p:cNvSpPr>
+          <p:nvPr>
+            <p:ph type="sldNum" sz="quarter" idx="12"/>
+          </p:nvPr>
+        </p:nvSpPr>
+        <p:spPr/>
+        <p:txBody>
+          <a:bodyPr/>
+          <a:lstStyle/>
+          <a:p>
+            <a:fld id="{2A013F82-EE5E-44EE-A61D-E31C6657F26F}" type="slidenum">
+              <a:rPr lang="en-US" smtClean="0"/>
+              <a:t>‹#›</a:t>
+            </a:fld>
+            <a:endParaRPr lang="en-US" dirty="0"/>
+          </a:p>
+        </p:txBody>
+      </p:sp>
+    </p:spTree>
+    <p:extLst>
+      <p:ext uri="{BB962C8B-B14F-4D97-AF65-F5344CB8AC3E}">
+        <p14:creationId xmlns:p14="http://schemas.microsoft.com/office/powerpoint/2010/main" val="1311550052"/>
+      </p:ext>
+    </p:extLst>
+  </p:cSld>
+  <p:clrMapOvr>
+    <a:masterClrMapping/>
+  </p:clrMapOvr>
+</p:sldLayout>
+</file>
+
+<file path=ppt/slideLayouts/slideLayout3.xml><?xml version="1.0" encoding="utf-8"?>
 <p:sldLayout xmlns:a="http://schemas.openxmlformats.org/drawingml/2006/main" xmlns:r="http://schemas.openxmlformats.org/officeDocument/2006/relationships" xmlns:p="http://schemas.openxmlformats.org/presentationml/2006/main">
   <p:cSld name="Title and Content">
     <p:spTree>
@@ -1455,7 +1869,7 @@
           <a:p>
             <a:fld id="{03F41C87-7AD9-4845-A077-840E4A0F3F06}" type="datetimeFigureOut">
               <a:rPr lang="en-US" dirty="0"/>
-              <a:t>12/29/2022</a:t>
+              <a:t>9/17/2024</a:t>
             </a:fld>
             <a:endParaRPr lang="en-US" dirty="0"/>
           </a:p>
@@ -1521,7 +1935,7 @@
 </p:sldLayout>
 </file>
 
-<file path=ppt/slideLayouts/slideLayout3.xml><?xml version="1.0" encoding="utf-8"?>
+<file path=ppt/slideLayouts/slideLayout4.xml><?xml version="1.0" encoding="utf-8"?>
 <p:sldLayout xmlns:a="http://schemas.openxmlformats.org/drawingml/2006/main" xmlns:r="http://schemas.openxmlformats.org/officeDocument/2006/relationships" xmlns:p="http://schemas.openxmlformats.org/presentationml/2006/main">
   <p:cSld name="Section Header">
     <p:spTree>
@@ -1717,7 +2131,7 @@
           <a:p>
             <a:fld id="{03F41C87-7AD9-4845-A077-840E4A0F3F06}" type="datetimeFigureOut">
               <a:rPr lang="en-US" dirty="0"/>
-              <a:t>12/29/2022</a:t>
+              <a:t>9/17/2024</a:t>
             </a:fld>
             <a:endParaRPr lang="en-US" dirty="0"/>
           </a:p>
@@ -1783,7 +2197,7 @@
 </p:sldLayout>
 </file>
 
-<file path=ppt/slideLayouts/slideLayout4.xml><?xml version="1.0" encoding="utf-8"?>
+<file path=ppt/slideLayouts/slideLayout5.xml><?xml version="1.0" encoding="utf-8"?>
 <p:sldLayout xmlns:a="http://schemas.openxmlformats.org/drawingml/2006/main" xmlns:r="http://schemas.openxmlformats.org/officeDocument/2006/relationships" xmlns:p="http://schemas.openxmlformats.org/presentationml/2006/main">
   <p:cSld name="Two Content">
     <p:spTree>
@@ -1967,7 +2381,7 @@
           <a:p>
             <a:fld id="{03F41C87-7AD9-4845-A077-840E4A0F3F06}" type="datetimeFigureOut">
               <a:rPr lang="en-US" dirty="0"/>
-              <a:t>12/29/2022</a:t>
+              <a:t>9/17/2024</a:t>
             </a:fld>
             <a:endParaRPr lang="en-US" dirty="0"/>
           </a:p>
@@ -2033,7 +2447,7 @@
 </p:sldLayout>
 </file>
 
-<file path=ppt/slideLayouts/slideLayout5.xml><?xml version="1.0" encoding="utf-8"?>
+<file path=ppt/slideLayouts/slideLayout6.xml><?xml version="1.0" encoding="utf-8"?>
 <p:sldLayout xmlns:a="http://schemas.openxmlformats.org/drawingml/2006/main" xmlns:r="http://schemas.openxmlformats.org/officeDocument/2006/relationships" xmlns:p="http://schemas.openxmlformats.org/presentationml/2006/main">
   <p:cSld name="Comparison">
     <p:spTree>
@@ -2357,7 +2771,7 @@
           <a:p>
             <a:fld id="{03F41C87-7AD9-4845-A077-840E4A0F3F06}" type="datetimeFigureOut">
               <a:rPr lang="en-US" dirty="0"/>
-              <a:t>12/29/2022</a:t>
+              <a:t>9/17/2024</a:t>
             </a:fld>
             <a:endParaRPr lang="en-US" dirty="0"/>
           </a:p>
@@ -2423,7 +2837,7 @@
 </p:sldLayout>
 </file>
 
-<file path=ppt/slideLayouts/slideLayout6.xml><?xml version="1.0" encoding="utf-8"?>
+<file path=ppt/slideLayouts/slideLayout7.xml><?xml version="1.0" encoding="utf-8"?>
 <p:sldLayout xmlns:a="http://schemas.openxmlformats.org/drawingml/2006/main" xmlns:r="http://schemas.openxmlformats.org/officeDocument/2006/relationships" xmlns:p="http://schemas.openxmlformats.org/presentationml/2006/main">
   <p:cSld name="Title Only">
     <p:spTree>
@@ -2489,7 +2903,7 @@
           <a:p>
             <a:fld id="{03F41C87-7AD9-4845-A077-840E4A0F3F06}" type="datetimeFigureOut">
               <a:rPr lang="en-US" dirty="0"/>
-              <a:t>12/29/2022</a:t>
+              <a:t>9/17/2024</a:t>
             </a:fld>
             <a:endParaRPr lang="en-US" dirty="0"/>
           </a:p>
@@ -2555,7 +2969,7 @@
 </p:sldLayout>
 </file>
 
-<file path=ppt/slideLayouts/slideLayout7.xml><?xml version="1.0" encoding="utf-8"?>
+<file path=ppt/slideLayouts/slideLayout8.xml><?xml version="1.0" encoding="utf-8"?>
 <p:sldLayout xmlns:a="http://schemas.openxmlformats.org/drawingml/2006/main" xmlns:r="http://schemas.openxmlformats.org/officeDocument/2006/relationships" xmlns:p="http://schemas.openxmlformats.org/presentationml/2006/main">
   <p:cSld name="Blank">
     <p:spTree>
@@ -2594,7 +3008,7 @@
           <a:p>
             <a:fld id="{03F41C87-7AD9-4845-A077-840E4A0F3F06}" type="datetimeFigureOut">
               <a:rPr lang="en-US" dirty="0"/>
-              <a:t>12/29/2022</a:t>
+              <a:t>9/17/2024</a:t>
             </a:fld>
             <a:endParaRPr lang="en-US" dirty="0"/>
           </a:p>
@@ -2660,7 +3074,7 @@
 </p:sldLayout>
 </file>
 
-<file path=ppt/slideLayouts/slideLayout8.xml><?xml version="1.0" encoding="utf-8"?>
+<file path=ppt/slideLayouts/slideLayout9.xml><?xml version="1.0" encoding="utf-8"?>
 <p:sldLayout xmlns:a="http://schemas.openxmlformats.org/drawingml/2006/main" xmlns:r="http://schemas.openxmlformats.org/officeDocument/2006/relationships" xmlns:p="http://schemas.openxmlformats.org/presentationml/2006/main">
   <p:cSld name="Content with Caption">
     <p:spTree>
@@ -2889,7 +3303,7 @@
           <a:p>
             <a:fld id="{03F41C87-7AD9-4845-A077-840E4A0F3F06}" type="datetimeFigureOut">
               <a:rPr lang="en-US" dirty="0"/>
-              <a:t>12/29/2022</a:t>
+              <a:t>9/17/2024</a:t>
             </a:fld>
             <a:endParaRPr lang="en-US" dirty="0"/>
           </a:p>
@@ -2940,279 +3354,6 @@
           <a:lstStyle/>
           <a:p>
             <a:fld id="{2A013F82-EE5E-44EE-A61D-E31C6657F26F}" type="slidenum">
-              <a:rPr lang="en-US" dirty="0"/>
-              <a:t>‹#›</a:t>
-            </a:fld>
-            <a:endParaRPr lang="en-US" dirty="0"/>
-          </a:p>
-        </p:txBody>
-      </p:sp>
-    </p:spTree>
-  </p:cSld>
-  <p:clrMapOvr>
-    <a:masterClrMapping/>
-  </p:clrMapOvr>
-</p:sldLayout>
-</file>
-
-<file path=ppt/slideLayouts/slideLayout9.xml><?xml version="1.0" encoding="utf-8"?>
-<p:sldLayout xmlns:a="http://schemas.openxmlformats.org/drawingml/2006/main" xmlns:r="http://schemas.openxmlformats.org/officeDocument/2006/relationships" xmlns:p="http://schemas.openxmlformats.org/presentationml/2006/main">
-  <p:cSld name="Picture with Caption">
-    <p:spTree>
-      <p:nvGrpSpPr>
-        <p:cNvPr id="1" name=""/>
-        <p:cNvGrpSpPr/>
-        <p:nvPr/>
-      </p:nvGrpSpPr>
-      <p:grpSpPr>
-        <a:xfrm>
-          <a:off x="0" y="0"/>
-          <a:ext cx="0" cy="0"/>
-          <a:chOff x="0" y="0"/>
-          <a:chExt cx="0" cy="0"/>
-        </a:xfrm>
-      </p:grpSpPr>
-      <p:sp>
-        <p:nvSpPr>
-          <p:cNvPr id="2" name="Title 1"/>
-          <p:cNvSpPr>
-            <a:spLocks noGrp="1"/>
-          </p:cNvSpPr>
-          <p:nvPr>
-            <p:ph type="title"/>
-          </p:nvPr>
-        </p:nvSpPr>
-        <p:spPr bwMode="white">
-          <a:xfrm>
-            <a:off x="839570" y="457200"/>
-            <a:ext cx="3931213" cy="1600200"/>
-          </a:xfrm>
-          <a:ln>
-            <a:headEnd type="none"/>
-            <a:tailEnd type="none"/>
-          </a:ln>
-        </p:spPr>
-        <p:txBody>
-          <a:bodyPr wrap="square" anchor="b"/>
-          <a:lstStyle>
-            <a:lvl1pPr>
-              <a:defRPr sz="3199" dirty="0"/>
-            </a:lvl1pPr>
-          </a:lstStyle>
-          <a:p>
-            <a:r>
-              <a:rPr lang="en-US" dirty="0"/>
-              <a:t>Click to edit Master title style</a:t>
-            </a:r>
-          </a:p>
-        </p:txBody>
-      </p:sp>
-      <p:sp>
-        <p:nvSpPr>
-          <p:cNvPr id="3" name="Picture Placeholder 2"/>
-          <p:cNvSpPr>
-            <a:spLocks noGrp="1"/>
-          </p:cNvSpPr>
-          <p:nvPr>
-            <p:ph type="pic" idx="1"/>
-          </p:nvPr>
-        </p:nvSpPr>
-        <p:spPr bwMode="white">
-          <a:xfrm>
-            <a:off x="5181838" y="987426"/>
-            <a:ext cx="6170593" cy="4873625"/>
-          </a:xfrm>
-          <a:ln>
-            <a:headEnd type="none"/>
-            <a:tailEnd type="none"/>
-          </a:ln>
-        </p:spPr>
-        <p:txBody>
-          <a:bodyPr wrap="square"/>
-          <a:lstStyle>
-            <a:lvl1pPr marL="0" indent="0">
-              <a:buNone/>
-              <a:defRPr sz="3199" dirty="0"/>
-            </a:lvl1pPr>
-            <a:lvl2pPr marL="457063" indent="0">
-              <a:buNone/>
-              <a:defRPr sz="2799" dirty="0"/>
-            </a:lvl2pPr>
-            <a:lvl3pPr marL="914126" indent="0">
-              <a:buNone/>
-              <a:defRPr sz="2399" dirty="0"/>
-            </a:lvl3pPr>
-            <a:lvl4pPr marL="1371189" indent="0">
-              <a:buNone/>
-              <a:defRPr sz="1999" dirty="0"/>
-            </a:lvl4pPr>
-            <a:lvl5pPr marL="1828251" indent="0">
-              <a:buNone/>
-              <a:defRPr sz="1999" dirty="0"/>
-            </a:lvl5pPr>
-            <a:lvl6pPr marL="2285314" indent="0">
-              <a:buNone/>
-              <a:defRPr sz="1999" dirty="0"/>
-            </a:lvl6pPr>
-            <a:lvl7pPr marL="2742377" indent="0">
-              <a:buNone/>
-              <a:defRPr sz="1999" dirty="0"/>
-            </a:lvl7pPr>
-            <a:lvl8pPr marL="3199440" indent="0">
-              <a:buNone/>
-              <a:defRPr sz="1999" dirty="0"/>
-            </a:lvl8pPr>
-            <a:lvl9pPr marL="3656503" indent="0">
-              <a:buNone/>
-              <a:defRPr sz="1999" dirty="0"/>
-            </a:lvl9pPr>
-          </a:lstStyle>
-          <a:p>
-            <a:endParaRPr lang="en-US" dirty="0"/>
-          </a:p>
-        </p:txBody>
-      </p:sp>
-      <p:sp>
-        <p:nvSpPr>
-          <p:cNvPr id="4" name="Text Placeholder 3"/>
-          <p:cNvSpPr>
-            <a:spLocks noGrp="1"/>
-          </p:cNvSpPr>
-          <p:nvPr>
-            <p:ph type="body" sz="half" idx="2"/>
-          </p:nvPr>
-        </p:nvSpPr>
-        <p:spPr bwMode="white">
-          <a:xfrm>
-            <a:off x="839570" y="2057400"/>
-            <a:ext cx="3931213" cy="3811588"/>
-          </a:xfrm>
-          <a:ln>
-            <a:headEnd type="none"/>
-            <a:tailEnd type="none"/>
-          </a:ln>
-        </p:spPr>
-        <p:txBody>
-          <a:bodyPr wrap="square"/>
-          <a:lstStyle>
-            <a:lvl1pPr marL="0" indent="0">
-              <a:buNone/>
-              <a:defRPr sz="1600" dirty="0"/>
-            </a:lvl1pPr>
-            <a:lvl2pPr marL="457063" indent="0">
-              <a:buNone/>
-              <a:defRPr sz="1400" dirty="0"/>
-            </a:lvl2pPr>
-            <a:lvl3pPr marL="914126" indent="0">
-              <a:buNone/>
-              <a:defRPr sz="1200" dirty="0"/>
-            </a:lvl3pPr>
-            <a:lvl4pPr marL="1371189" indent="0">
-              <a:buNone/>
-              <a:defRPr sz="1000" dirty="0"/>
-            </a:lvl4pPr>
-            <a:lvl5pPr marL="1828251" indent="0">
-              <a:buNone/>
-              <a:defRPr sz="1000" dirty="0"/>
-            </a:lvl5pPr>
-            <a:lvl6pPr marL="2285314" indent="0">
-              <a:buNone/>
-              <a:defRPr sz="1000" dirty="0"/>
-            </a:lvl6pPr>
-            <a:lvl7pPr marL="2742377" indent="0">
-              <a:buNone/>
-              <a:defRPr sz="1000" dirty="0"/>
-            </a:lvl7pPr>
-            <a:lvl8pPr marL="3199440" indent="0">
-              <a:buNone/>
-              <a:defRPr sz="1000" dirty="0"/>
-            </a:lvl8pPr>
-            <a:lvl9pPr marL="3656503" indent="0">
-              <a:buNone/>
-              <a:defRPr sz="1000" dirty="0"/>
-            </a:lvl9pPr>
-          </a:lstStyle>
-          <a:p>
-            <a:r>
-              <a:rPr lang="en-US" dirty="0"/>
-              <a:t>Click to edit Master text styles</a:t>
-            </a:r>
-          </a:p>
-        </p:txBody>
-      </p:sp>
-      <p:sp>
-        <p:nvSpPr>
-          <p:cNvPr id="5" name="Date Placeholder 4"/>
-          <p:cNvSpPr>
-            <a:spLocks noGrp="1"/>
-          </p:cNvSpPr>
-          <p:nvPr>
-            <p:ph type="dt" sz="half" idx="10"/>
-          </p:nvPr>
-        </p:nvSpPr>
-        <p:spPr bwMode="white">
-          <a:ln>
-            <a:headEnd type="none"/>
-            <a:tailEnd type="none"/>
-          </a:ln>
-        </p:spPr>
-        <p:txBody>
-          <a:bodyPr wrap="square"/>
-          <a:lstStyle/>
-          <a:p>
-            <a:fld id="{B61BEF0D-F0BB-DE4B-95CE-6DB70DBA9567}" type="datetimeFigureOut">
-              <a:rPr lang="en-US" dirty="0"/>
-              <a:t>12/29/2022</a:t>
-            </a:fld>
-            <a:endParaRPr lang="en-US" dirty="0"/>
-          </a:p>
-        </p:txBody>
-      </p:sp>
-      <p:sp>
-        <p:nvSpPr>
-          <p:cNvPr id="6" name="Footer Placeholder 5"/>
-          <p:cNvSpPr>
-            <a:spLocks noGrp="1"/>
-          </p:cNvSpPr>
-          <p:nvPr>
-            <p:ph type="ftr" sz="quarter" idx="11"/>
-          </p:nvPr>
-        </p:nvSpPr>
-        <p:spPr bwMode="white">
-          <a:ln>
-            <a:headEnd type="none"/>
-            <a:tailEnd type="none"/>
-          </a:ln>
-        </p:spPr>
-        <p:txBody>
-          <a:bodyPr wrap="square"/>
-          <a:lstStyle/>
-          <a:p>
-            <a:endParaRPr lang="en-US" dirty="0"/>
-          </a:p>
-        </p:txBody>
-      </p:sp>
-      <p:sp>
-        <p:nvSpPr>
-          <p:cNvPr id="7" name="Slide Number Placeholder 6"/>
-          <p:cNvSpPr>
-            <a:spLocks noGrp="1"/>
-          </p:cNvSpPr>
-          <p:nvPr>
-            <p:ph type="sldNum" sz="quarter" idx="12"/>
-          </p:nvPr>
-        </p:nvSpPr>
-        <p:spPr bwMode="white">
-          <a:ln>
-            <a:headEnd type="none"/>
-            <a:tailEnd type="none"/>
-          </a:ln>
-        </p:spPr>
-        <p:txBody>
-          <a:bodyPr wrap="square"/>
-          <a:lstStyle/>
-          <a:p>
-            <a:fld id="{D57F1E4F-1CFF-5643-939E-217C01CDF565}" type="slidenum">
               <a:rPr lang="en-US" dirty="0"/>
               <a:t>‹#›</a:t>
             </a:fld>
@@ -3392,7 +3533,7 @@
           <a:p>
             <a:fld id="{03F41C87-7AD9-4845-A077-840E4A0F3F06}" type="datetimeFigureOut">
               <a:rPr lang="en-US" dirty="0"/>
-              <a:t>12/29/2022</a:t>
+              <a:t>9/17/2024</a:t>
             </a:fld>
             <a:endParaRPr lang="en-US" dirty="0"/>
           </a:p>
@@ -3489,16 +3630,17 @@
   <p:clrMap bg1="lt1" tx1="dk1" bg2="lt2" tx2="dk2" accent1="accent1" accent2="accent2" accent3="accent3" accent4="accent4" accent5="accent5" accent6="accent6" hlink="hlink" folHlink="folHlink"/>
   <p:sldLayoutIdLst>
     <p:sldLayoutId id="2147483679" r:id="rId1"/>
-    <p:sldLayoutId id="2147483680" r:id="rId2"/>
-    <p:sldLayoutId id="2147483681" r:id="rId3"/>
-    <p:sldLayoutId id="2147483682" r:id="rId4"/>
-    <p:sldLayoutId id="2147483683" r:id="rId5"/>
-    <p:sldLayoutId id="2147483684" r:id="rId6"/>
-    <p:sldLayoutId id="2147483685" r:id="rId7"/>
-    <p:sldLayoutId id="2147483686" r:id="rId8"/>
-    <p:sldLayoutId id="2147483687" r:id="rId9"/>
-    <p:sldLayoutId id="2147483688" r:id="rId10"/>
-    <p:sldLayoutId id="2147483689" r:id="rId11"/>
+    <p:sldLayoutId id="2147483690" r:id="rId2"/>
+    <p:sldLayoutId id="2147483680" r:id="rId3"/>
+    <p:sldLayoutId id="2147483681" r:id="rId4"/>
+    <p:sldLayoutId id="2147483682" r:id="rId5"/>
+    <p:sldLayoutId id="2147483683" r:id="rId6"/>
+    <p:sldLayoutId id="2147483684" r:id="rId7"/>
+    <p:sldLayoutId id="2147483685" r:id="rId8"/>
+    <p:sldLayoutId id="2147483686" r:id="rId9"/>
+    <p:sldLayoutId id="2147483687" r:id="rId10"/>
+    <p:sldLayoutId id="2147483688" r:id="rId11"/>
+    <p:sldLayoutId id="2147483689" r:id="rId12"/>
   </p:sldLayoutIdLst>
   <p:txStyles>
     <p:titleStyle>

</xml_diff>